<commit_message>
Correção de layout column e pasta images
</commit_message>
<xml_diff>
--- a/Aula07-Layouts no Flutter/Aula07-Layouts no Flutter.pptx
+++ b/Aula07-Layouts no Flutter/Aula07-Layouts no Flutter.pptx
@@ -169,6 +169,7 @@
 <p1510:revInfo xmlns:a="http://schemas.openxmlformats.org/drawingml/2006/main" xmlns:r="http://schemas.openxmlformats.org/officeDocument/2006/relationships" xmlns:p1510="http://schemas.microsoft.com/office/powerpoint/2015/10/main">
   <p1510:revLst>
     <p1510:client id="{005E03CD-EFF0-41C2-AA4E-14BAF2BC1F0F}" v="28" dt="2024-03-31T17:54:42.808"/>
+    <p1510:client id="{4614427A-7FD7-4BB3-BFFA-0F1CA40DB76D}" v="108" dt="2024-03-31T18:02:43.844"/>
   </p1510:revLst>
 </p1510:revInfo>
 </file>
@@ -7793,7 +7794,7 @@
         </p:nvSpPr>
         <p:spPr>
           <a:xfrm>
-            <a:off x="1028700" y="4511950"/>
+            <a:off x="1028700" y="4774532"/>
             <a:ext cx="13449758" cy="1617514"/>
           </a:xfrm>
           <a:custGeom>
@@ -7924,7 +7925,7 @@
         <p:spPr>
           <a:xfrm>
             <a:off x="1028700" y="1578814"/>
-            <a:ext cx="16230600" cy="2734309"/>
+            <a:ext cx="16230600" cy="3187283"/>
           </a:xfrm>
           <a:prstGeom prst="rect">
             <a:avLst/>
@@ -7942,36 +7943,97 @@
               </a:lnSpc>
             </a:pPr>
             <a:r>
-              <a:rPr lang="en-US" sz="2600" spc="260">
-                <a:solidFill>
-                  <a:srgbClr val="000000"/>
-                </a:solidFill>
-                <a:latin typeface="Lato"/>
-              </a:rPr>
-              <a:t>Criação de layout com Column e três widgets images, disponível em: &lt;</a:t>
-            </a:r>
-            <a:r>
-              <a:rPr lang="en-US" sz="2600" u="sng" spc="260">
-                <a:solidFill>
-                  <a:srgbClr val="5271FF"/>
-                </a:solidFill>
-                <a:latin typeface="Lato"/>
-                <a:hlinkClick r:id="rId3" tooltip="https://github.com/marcosdosea/TreinamentoFlutter/blob/main/Aula07-Layouts%20no%20Flutter/layoutColumn.dart"/>
-              </a:rPr>
-              <a:t>Link github</a:t>
-            </a:r>
-            <a:r>
-              <a:rPr lang="en-US" sz="2600" spc="260">
-                <a:solidFill>
-                  <a:srgbClr val="000000"/>
-                </a:solidFill>
-                <a:latin typeface="Lato"/>
-              </a:rPr>
-              <a:t>&gt;.</a:t>
-            </a:r>
-          </a:p>
-          <a:p>
-            <a:pPr marL="561345" lvl="1" indent="-280673" algn="just">
+              <a:rPr lang="en-US" sz="2600" spc="260" dirty="0" err="1">
+                <a:solidFill>
+                  <a:srgbClr val="000000"/>
+                </a:solidFill>
+                <a:latin typeface="Lato"/>
+              </a:rPr>
+              <a:t>Criação</a:t>
+            </a:r>
+            <a:r>
+              <a:rPr lang="en-US" sz="2600" spc="260" dirty="0">
+                <a:solidFill>
+                  <a:srgbClr val="000000"/>
+                </a:solidFill>
+                <a:latin typeface="Lato"/>
+              </a:rPr>
+              <a:t> de layout com Column e </a:t>
+            </a:r>
+            <a:r>
+              <a:rPr lang="en-US" sz="2600" spc="260" dirty="0" err="1">
+                <a:solidFill>
+                  <a:srgbClr val="000000"/>
+                </a:solidFill>
+                <a:latin typeface="Lato"/>
+              </a:rPr>
+              <a:t>três</a:t>
+            </a:r>
+            <a:r>
+              <a:rPr lang="en-US" sz="2600" spc="260" dirty="0">
+                <a:solidFill>
+                  <a:srgbClr val="000000"/>
+                </a:solidFill>
+                <a:latin typeface="Lato"/>
+              </a:rPr>
+              <a:t> widgets images, </a:t>
+            </a:r>
+            <a:r>
+              <a:rPr lang="en-US" sz="2600" spc="260" dirty="0" err="1">
+                <a:solidFill>
+                  <a:srgbClr val="000000"/>
+                </a:solidFill>
+                <a:latin typeface="Lato"/>
+              </a:rPr>
+              <a:t>disponível</a:t>
+            </a:r>
+            <a:r>
+              <a:rPr lang="en-US" sz="2600" spc="260" dirty="0">
+                <a:solidFill>
+                  <a:srgbClr val="000000"/>
+                </a:solidFill>
+                <a:latin typeface="Lato"/>
+              </a:rPr>
+              <a:t> </a:t>
+            </a:r>
+            <a:r>
+              <a:rPr lang="en-US" sz="2600" spc="260" dirty="0" err="1">
+                <a:solidFill>
+                  <a:srgbClr val="000000"/>
+                </a:solidFill>
+                <a:latin typeface="Lato"/>
+              </a:rPr>
+              <a:t>em</a:t>
+            </a:r>
+            <a:r>
+              <a:rPr lang="en-US" sz="2600" spc="260" dirty="0">
+                <a:solidFill>
+                  <a:srgbClr val="000000"/>
+                </a:solidFill>
+                <a:latin typeface="Lato"/>
+              </a:rPr>
+              <a:t> </a:t>
+            </a:r>
+            <a:r>
+              <a:rPr lang="en-US" sz="2600" spc="260" dirty="0" err="1">
+                <a:solidFill>
+                  <a:srgbClr val="000000"/>
+                </a:solidFill>
+                <a:latin typeface="Lato"/>
+              </a:rPr>
+              <a:t>layoutColumn.dart</a:t>
+            </a:r>
+            <a:endParaRPr lang="en-US" sz="2600" spc="260" dirty="0" err="1">
+              <a:solidFill>
+                <a:srgbClr val="000000"/>
+              </a:solidFill>
+              <a:latin typeface="Lato"/>
+              <a:ea typeface="Lato"/>
+              <a:cs typeface="Lato"/>
+            </a:endParaRPr>
+          </a:p>
+          <a:p>
+            <a:pPr marL="561340" lvl="1" indent="-280670" algn="just">
               <a:lnSpc>
                 <a:spcPts val="3640"/>
               </a:lnSpc>
@@ -7979,16 +8041,286 @@
               <a:buChar char="•"/>
             </a:pPr>
             <a:r>
-              <a:rPr lang="en-US" sz="2600" spc="260">
-                <a:solidFill>
-                  <a:srgbClr val="000000"/>
-                </a:solidFill>
-                <a:latin typeface="Lato"/>
-              </a:rPr>
-              <a:t>Para utilizarmos imagens em projetos Flutter, conforme o exemplo acima, temos que criar um diretório chamado images na raiz do projeto e copiar para ele as </a:t>
-            </a:r>
-            <a:r>
-              <a:rPr lang="en-US" sz="2600" spc="260">
+              <a:rPr lang="en-US" sz="2600" spc="260" dirty="0">
+                <a:solidFill>
+                  <a:srgbClr val="000000"/>
+                </a:solidFill>
+                <a:latin typeface="Lato"/>
+              </a:rPr>
+              <a:t>Para </a:t>
+            </a:r>
+            <a:r>
+              <a:rPr lang="en-US" sz="2600" spc="260" dirty="0" err="1">
+                <a:solidFill>
+                  <a:srgbClr val="000000"/>
+                </a:solidFill>
+                <a:latin typeface="Lato"/>
+              </a:rPr>
+              <a:t>utilizarmos</a:t>
+            </a:r>
+            <a:r>
+              <a:rPr lang="en-US" sz="2600" spc="260" dirty="0">
+                <a:solidFill>
+                  <a:srgbClr val="000000"/>
+                </a:solidFill>
+                <a:latin typeface="Lato"/>
+              </a:rPr>
+              <a:t> imagens </a:t>
+            </a:r>
+            <a:r>
+              <a:rPr lang="en-US" sz="2600" spc="260" dirty="0" err="1">
+                <a:solidFill>
+                  <a:srgbClr val="000000"/>
+                </a:solidFill>
+                <a:latin typeface="Lato"/>
+              </a:rPr>
+              <a:t>em</a:t>
+            </a:r>
+            <a:r>
+              <a:rPr lang="en-US" sz="2600" spc="260" dirty="0">
+                <a:solidFill>
+                  <a:srgbClr val="000000"/>
+                </a:solidFill>
+                <a:latin typeface="Lato"/>
+              </a:rPr>
+              <a:t> </a:t>
+            </a:r>
+            <a:r>
+              <a:rPr lang="en-US" sz="2600" spc="260" dirty="0" err="1">
+                <a:solidFill>
+                  <a:srgbClr val="000000"/>
+                </a:solidFill>
+                <a:latin typeface="Lato"/>
+              </a:rPr>
+              <a:t>projetos</a:t>
+            </a:r>
+            <a:r>
+              <a:rPr lang="en-US" sz="2600" spc="260" dirty="0">
+                <a:solidFill>
+                  <a:srgbClr val="000000"/>
+                </a:solidFill>
+                <a:latin typeface="Lato"/>
+              </a:rPr>
+              <a:t> Flutter, </a:t>
+            </a:r>
+            <a:r>
+              <a:rPr lang="en-US" sz="2600" spc="260" dirty="0" err="1">
+                <a:solidFill>
+                  <a:srgbClr val="000000"/>
+                </a:solidFill>
+                <a:latin typeface="Lato"/>
+              </a:rPr>
+              <a:t>conforme</a:t>
+            </a:r>
+            <a:r>
+              <a:rPr lang="en-US" sz="2600" spc="260" dirty="0">
+                <a:solidFill>
+                  <a:srgbClr val="000000"/>
+                </a:solidFill>
+                <a:latin typeface="Lato"/>
+              </a:rPr>
+              <a:t> o </a:t>
+            </a:r>
+            <a:r>
+              <a:rPr lang="en-US" sz="2600" spc="260" dirty="0" err="1">
+                <a:solidFill>
+                  <a:srgbClr val="000000"/>
+                </a:solidFill>
+                <a:latin typeface="Lato"/>
+              </a:rPr>
+              <a:t>exemplo</a:t>
+            </a:r>
+            <a:r>
+              <a:rPr lang="en-US" sz="2600" spc="260" dirty="0">
+                <a:solidFill>
+                  <a:srgbClr val="000000"/>
+                </a:solidFill>
+                <a:latin typeface="Lato"/>
+              </a:rPr>
+              <a:t> </a:t>
+            </a:r>
+            <a:r>
+              <a:rPr lang="en-US" sz="2600" spc="260" dirty="0" err="1">
+                <a:solidFill>
+                  <a:srgbClr val="000000"/>
+                </a:solidFill>
+                <a:latin typeface="Lato"/>
+              </a:rPr>
+              <a:t>acima</a:t>
+            </a:r>
+            <a:r>
+              <a:rPr lang="en-US" sz="2600" spc="260" dirty="0">
+                <a:solidFill>
+                  <a:srgbClr val="000000"/>
+                </a:solidFill>
+                <a:latin typeface="Lato"/>
+              </a:rPr>
+              <a:t>, </a:t>
+            </a:r>
+            <a:r>
+              <a:rPr lang="en-US" sz="2600" spc="260" dirty="0" err="1">
+                <a:solidFill>
+                  <a:srgbClr val="000000"/>
+                </a:solidFill>
+                <a:latin typeface="Lato"/>
+              </a:rPr>
+              <a:t>temos</a:t>
+            </a:r>
+            <a:r>
+              <a:rPr lang="en-US" sz="2600" spc="260" dirty="0">
+                <a:solidFill>
+                  <a:srgbClr val="000000"/>
+                </a:solidFill>
+                <a:latin typeface="Lato"/>
+              </a:rPr>
+              <a:t> que </a:t>
+            </a:r>
+            <a:r>
+              <a:rPr lang="en-US" sz="2600" spc="260" dirty="0" err="1">
+                <a:solidFill>
+                  <a:srgbClr val="000000"/>
+                </a:solidFill>
+                <a:latin typeface="Lato"/>
+              </a:rPr>
+              <a:t>criar</a:t>
+            </a:r>
+            <a:r>
+              <a:rPr lang="en-US" sz="2600" spc="260" dirty="0">
+                <a:solidFill>
+                  <a:srgbClr val="000000"/>
+                </a:solidFill>
+                <a:latin typeface="Lato"/>
+              </a:rPr>
+              <a:t> um </a:t>
+            </a:r>
+            <a:r>
+              <a:rPr lang="en-US" sz="2600" spc="260" dirty="0" err="1">
+                <a:solidFill>
+                  <a:srgbClr val="000000"/>
+                </a:solidFill>
+                <a:latin typeface="Lato"/>
+              </a:rPr>
+              <a:t>diretório</a:t>
+            </a:r>
+            <a:r>
+              <a:rPr lang="en-US" sz="2600" spc="260" dirty="0">
+                <a:solidFill>
+                  <a:srgbClr val="000000"/>
+                </a:solidFill>
+                <a:latin typeface="Lato"/>
+              </a:rPr>
+              <a:t> </a:t>
+            </a:r>
+            <a:r>
+              <a:rPr lang="en-US" sz="2600" spc="260" dirty="0" err="1">
+                <a:solidFill>
+                  <a:srgbClr val="000000"/>
+                </a:solidFill>
+                <a:latin typeface="Lato"/>
+              </a:rPr>
+              <a:t>chamado</a:t>
+            </a:r>
+            <a:r>
+              <a:rPr lang="en-US" sz="2600" spc="260" dirty="0">
+                <a:solidFill>
+                  <a:srgbClr val="000000"/>
+                </a:solidFill>
+                <a:latin typeface="Lato"/>
+              </a:rPr>
+              <a:t> images </a:t>
+            </a:r>
+            <a:r>
+              <a:rPr lang="en-US" sz="2600" spc="260" dirty="0" err="1">
+                <a:solidFill>
+                  <a:srgbClr val="000000"/>
+                </a:solidFill>
+                <a:latin typeface="Lato"/>
+              </a:rPr>
+              <a:t>na</a:t>
+            </a:r>
+            <a:r>
+              <a:rPr lang="en-US" sz="2600" spc="260" dirty="0">
+                <a:solidFill>
+                  <a:srgbClr val="000000"/>
+                </a:solidFill>
+                <a:latin typeface="Lato"/>
+              </a:rPr>
+              <a:t> </a:t>
+            </a:r>
+            <a:r>
+              <a:rPr lang="en-US" sz="2600" spc="260" dirty="0" err="1">
+                <a:solidFill>
+                  <a:srgbClr val="000000"/>
+                </a:solidFill>
+                <a:latin typeface="Lato"/>
+              </a:rPr>
+              <a:t>raiz</a:t>
+            </a:r>
+            <a:r>
+              <a:rPr lang="en-US" sz="2600" spc="260" dirty="0">
+                <a:solidFill>
+                  <a:srgbClr val="000000"/>
+                </a:solidFill>
+                <a:latin typeface="Lato"/>
+              </a:rPr>
+              <a:t> do </a:t>
+            </a:r>
+            <a:r>
+              <a:rPr lang="en-US" sz="2600" spc="260" dirty="0" err="1">
+                <a:solidFill>
+                  <a:srgbClr val="000000"/>
+                </a:solidFill>
+                <a:latin typeface="Lato"/>
+              </a:rPr>
+              <a:t>projeto</a:t>
+            </a:r>
+            <a:r>
+              <a:rPr lang="en-US" sz="2600" spc="260" dirty="0">
+                <a:solidFill>
+                  <a:srgbClr val="000000"/>
+                </a:solidFill>
+                <a:latin typeface="Lato"/>
+              </a:rPr>
+              <a:t> e </a:t>
+            </a:r>
+            <a:r>
+              <a:rPr lang="en-US" sz="2600" spc="260" dirty="0" err="1">
+                <a:solidFill>
+                  <a:srgbClr val="000000"/>
+                </a:solidFill>
+                <a:latin typeface="Lato"/>
+              </a:rPr>
+              <a:t>copiar</a:t>
+            </a:r>
+            <a:r>
+              <a:rPr lang="en-US" sz="2600" spc="260" dirty="0">
+                <a:solidFill>
+                  <a:srgbClr val="000000"/>
+                </a:solidFill>
+                <a:latin typeface="Lato"/>
+              </a:rPr>
+              <a:t> para </a:t>
+            </a:r>
+            <a:r>
+              <a:rPr lang="en-US" sz="2600" spc="260" dirty="0" err="1">
+                <a:solidFill>
+                  <a:srgbClr val="000000"/>
+                </a:solidFill>
+                <a:latin typeface="Lato"/>
+              </a:rPr>
+              <a:t>ele</a:t>
+            </a:r>
+            <a:r>
+              <a:rPr lang="en-US" sz="2600" spc="260" dirty="0">
+                <a:solidFill>
+                  <a:srgbClr val="000000"/>
+                </a:solidFill>
+                <a:latin typeface="Lato"/>
+              </a:rPr>
+              <a:t> as </a:t>
+            </a:r>
+            <a:r>
+              <a:rPr lang="en-US" sz="2600" spc="260" dirty="0">
                 <a:solidFill>
                   <a:srgbClr val="000000"/>
                 </a:solidFill>
@@ -7997,16 +8329,142 @@
               <a:t>imagens</a:t>
             </a:r>
             <a:r>
-              <a:rPr lang="en-US" sz="2600" spc="260">
-                <a:solidFill>
-                  <a:srgbClr val="000000"/>
-                </a:solidFill>
-                <a:latin typeface="Lato"/>
-              </a:rPr>
-              <a:t> que queremos usar. Também precisamos alterar o arquivo </a:t>
-            </a:r>
-            <a:r>
-              <a:rPr lang="en-US" sz="2600" spc="260">
+              <a:rPr lang="en-US" sz="2600" spc="260" dirty="0">
+                <a:solidFill>
+                  <a:srgbClr val="000000"/>
+                </a:solidFill>
+                <a:latin typeface="Lato"/>
+              </a:rPr>
+              <a:t> que </a:t>
+            </a:r>
+            <a:r>
+              <a:rPr lang="en-US" sz="2600" spc="260" dirty="0" err="1">
+                <a:solidFill>
+                  <a:srgbClr val="000000"/>
+                </a:solidFill>
+                <a:latin typeface="Lato"/>
+              </a:rPr>
+              <a:t>queremos</a:t>
+            </a:r>
+            <a:r>
+              <a:rPr lang="en-US" sz="2600" spc="260" dirty="0">
+                <a:solidFill>
+                  <a:srgbClr val="000000"/>
+                </a:solidFill>
+                <a:latin typeface="Lato"/>
+              </a:rPr>
+              <a:t> usar, para </a:t>
+            </a:r>
+            <a:r>
+              <a:rPr lang="en-US" sz="2600" spc="260" dirty="0" err="1">
+                <a:solidFill>
+                  <a:srgbClr val="000000"/>
+                </a:solidFill>
+                <a:latin typeface="Lato"/>
+              </a:rPr>
+              <a:t>esse</a:t>
+            </a:r>
+            <a:r>
+              <a:rPr lang="en-US" sz="2600" spc="260" dirty="0">
+                <a:solidFill>
+                  <a:srgbClr val="000000"/>
+                </a:solidFill>
+                <a:latin typeface="Lato"/>
+              </a:rPr>
+              <a:t> </a:t>
+            </a:r>
+            <a:r>
+              <a:rPr lang="en-US" sz="2600" spc="260" dirty="0" err="1">
+                <a:solidFill>
+                  <a:srgbClr val="000000"/>
+                </a:solidFill>
+                <a:latin typeface="Lato"/>
+              </a:rPr>
+              <a:t>projeto</a:t>
+            </a:r>
+            <a:r>
+              <a:rPr lang="en-US" sz="2600" spc="260" dirty="0">
+                <a:solidFill>
+                  <a:srgbClr val="000000"/>
+                </a:solidFill>
+                <a:latin typeface="Lato"/>
+              </a:rPr>
+              <a:t> utilize a pasta images. </a:t>
+            </a:r>
+            <a:r>
+              <a:rPr lang="en-US" sz="2600" spc="260" dirty="0" err="1">
+                <a:solidFill>
+                  <a:srgbClr val="000000"/>
+                </a:solidFill>
+                <a:latin typeface="Lato"/>
+              </a:rPr>
+              <a:t>Também</a:t>
+            </a:r>
+            <a:r>
+              <a:rPr lang="en-US" sz="2600" spc="260" dirty="0">
+                <a:solidFill>
+                  <a:srgbClr val="000000"/>
+                </a:solidFill>
+                <a:latin typeface="Lato"/>
+              </a:rPr>
+              <a:t> </a:t>
+            </a:r>
+            <a:r>
+              <a:rPr lang="en-US" sz="2600" spc="260" dirty="0" err="1">
+                <a:solidFill>
+                  <a:srgbClr val="000000"/>
+                </a:solidFill>
+                <a:latin typeface="Lato"/>
+              </a:rPr>
+              <a:t>precisamos</a:t>
+            </a:r>
+            <a:r>
+              <a:rPr lang="en-US" sz="2600" spc="260" dirty="0">
+                <a:solidFill>
+                  <a:srgbClr val="000000"/>
+                </a:solidFill>
+                <a:latin typeface="Lato"/>
+              </a:rPr>
+              <a:t> </a:t>
+            </a:r>
+            <a:r>
+              <a:rPr lang="en-US" sz="2600" spc="260" dirty="0" err="1">
+                <a:solidFill>
+                  <a:srgbClr val="000000"/>
+                </a:solidFill>
+                <a:latin typeface="Lato"/>
+              </a:rPr>
+              <a:t>alterar</a:t>
+            </a:r>
+            <a:r>
+              <a:rPr lang="en-US" sz="2600" spc="260" dirty="0">
+                <a:solidFill>
+                  <a:srgbClr val="000000"/>
+                </a:solidFill>
+                <a:latin typeface="Lato"/>
+              </a:rPr>
+              <a:t> o </a:t>
+            </a:r>
+            <a:r>
+              <a:rPr lang="en-US" sz="2600" spc="260" dirty="0" err="1">
+                <a:solidFill>
+                  <a:srgbClr val="000000"/>
+                </a:solidFill>
+                <a:latin typeface="Lato"/>
+              </a:rPr>
+              <a:t>arquivo</a:t>
+            </a:r>
+            <a:r>
+              <a:rPr lang="en-US" sz="2600" spc="260" dirty="0">
+                <a:solidFill>
+                  <a:srgbClr val="000000"/>
+                </a:solidFill>
+                <a:latin typeface="Lato"/>
+              </a:rPr>
+              <a:t> </a:t>
+            </a:r>
+            <a:r>
+              <a:rPr lang="en-US" sz="2600" spc="260" dirty="0" err="1">
                 <a:solidFill>
                   <a:srgbClr val="000000"/>
                 </a:solidFill>
@@ -8015,14 +8473,58 @@
               <a:t>pubspec.yaml</a:t>
             </a:r>
             <a:r>
-              <a:rPr lang="en-US" sz="2600" spc="260">
-                <a:solidFill>
-                  <a:srgbClr val="000000"/>
-                </a:solidFill>
-                <a:latin typeface="Lato"/>
-              </a:rPr>
-              <a:t> no diretório raiz.</a:t>
-            </a:r>
+              <a:rPr lang="en-US" sz="2600" spc="260" dirty="0">
+                <a:solidFill>
+                  <a:srgbClr val="000000"/>
+                </a:solidFill>
+                <a:latin typeface="Lato"/>
+              </a:rPr>
+              <a:t> no </a:t>
+            </a:r>
+            <a:r>
+              <a:rPr lang="en-US" sz="2600" spc="260" dirty="0" err="1">
+                <a:solidFill>
+                  <a:srgbClr val="000000"/>
+                </a:solidFill>
+                <a:latin typeface="Lato"/>
+              </a:rPr>
+              <a:t>diretório</a:t>
+            </a:r>
+            <a:r>
+              <a:rPr lang="en-US" sz="2600" spc="260" dirty="0">
+                <a:solidFill>
+                  <a:srgbClr val="000000"/>
+                </a:solidFill>
+                <a:latin typeface="Lato"/>
+              </a:rPr>
+              <a:t> </a:t>
+            </a:r>
+            <a:r>
+              <a:rPr lang="en-US" sz="2600" spc="260" dirty="0" err="1">
+                <a:solidFill>
+                  <a:srgbClr val="000000"/>
+                </a:solidFill>
+                <a:latin typeface="Lato"/>
+              </a:rPr>
+              <a:t>raiz</a:t>
+            </a:r>
+            <a:r>
+              <a:rPr lang="en-US" sz="2600" spc="260" dirty="0">
+                <a:solidFill>
+                  <a:srgbClr val="000000"/>
+                </a:solidFill>
+                <a:latin typeface="Lato"/>
+              </a:rPr>
+              <a:t>.</a:t>
+            </a:r>
+            <a:endParaRPr lang="en-US" sz="2600" spc="260" dirty="0">
+              <a:solidFill>
+                <a:srgbClr val="000000"/>
+              </a:solidFill>
+              <a:latin typeface="Lato"/>
+              <a:ea typeface="Lato"/>
+              <a:cs typeface="Lato"/>
+            </a:endParaRPr>
           </a:p>
           <a:p>
             <a:pPr algn="just">
@@ -8044,14 +8546,148 @@
               </a:lnSpc>
             </a:pPr>
             <a:r>
-              <a:rPr lang="en-US" sz="2600" spc="260">
-                <a:solidFill>
-                  <a:srgbClr val="000000"/>
-                </a:solidFill>
-                <a:latin typeface="Lato"/>
-              </a:rPr>
-              <a:t>Para isso, abra o arquivo e localize o seguinte trecho de código dentro dele:</a:t>
-            </a:r>
+              <a:rPr lang="en-US" sz="2600" spc="260" dirty="0">
+                <a:solidFill>
+                  <a:srgbClr val="000000"/>
+                </a:solidFill>
+                <a:latin typeface="Lato"/>
+              </a:rPr>
+              <a:t>Para </a:t>
+            </a:r>
+            <a:r>
+              <a:rPr lang="en-US" sz="2600" spc="260" dirty="0" err="1">
+                <a:solidFill>
+                  <a:srgbClr val="000000"/>
+                </a:solidFill>
+                <a:latin typeface="Lato"/>
+              </a:rPr>
+              <a:t>isso</a:t>
+            </a:r>
+            <a:r>
+              <a:rPr lang="en-US" sz="2600" spc="260" dirty="0">
+                <a:solidFill>
+                  <a:srgbClr val="000000"/>
+                </a:solidFill>
+                <a:latin typeface="Lato"/>
+              </a:rPr>
+              <a:t>, abra o </a:t>
+            </a:r>
+            <a:r>
+              <a:rPr lang="en-US" sz="2600" spc="260" dirty="0" err="1">
+                <a:solidFill>
+                  <a:srgbClr val="000000"/>
+                </a:solidFill>
+                <a:latin typeface="Lato"/>
+              </a:rPr>
+              <a:t>arquivo</a:t>
+            </a:r>
+            <a:r>
+              <a:rPr lang="en-US" sz="2600" spc="260" dirty="0">
+                <a:solidFill>
+                  <a:srgbClr val="000000"/>
+                </a:solidFill>
+                <a:latin typeface="Lato"/>
+              </a:rPr>
+              <a:t> e localize o </a:t>
+            </a:r>
+            <a:r>
+              <a:rPr lang="en-US" sz="2600" spc="260" dirty="0" err="1">
+                <a:solidFill>
+                  <a:srgbClr val="000000"/>
+                </a:solidFill>
+                <a:latin typeface="Lato"/>
+              </a:rPr>
+              <a:t>seguinte</a:t>
+            </a:r>
+            <a:r>
+              <a:rPr lang="en-US" sz="2600" spc="260" dirty="0">
+                <a:solidFill>
+                  <a:srgbClr val="000000"/>
+                </a:solidFill>
+                <a:latin typeface="Lato"/>
+              </a:rPr>
+              <a:t> </a:t>
+            </a:r>
+            <a:r>
+              <a:rPr lang="en-US" sz="2600" spc="260" dirty="0" err="1">
+                <a:solidFill>
+                  <a:srgbClr val="000000"/>
+                </a:solidFill>
+                <a:latin typeface="Lato"/>
+              </a:rPr>
+              <a:t>trecho</a:t>
+            </a:r>
+            <a:r>
+              <a:rPr lang="en-US" sz="2600" spc="260" dirty="0">
+                <a:solidFill>
+                  <a:srgbClr val="000000"/>
+                </a:solidFill>
+                <a:latin typeface="Lato"/>
+              </a:rPr>
+              <a:t> de </a:t>
+            </a:r>
+            <a:r>
+              <a:rPr lang="en-US" sz="2600" spc="260" dirty="0" err="1">
+                <a:solidFill>
+                  <a:srgbClr val="000000"/>
+                </a:solidFill>
+                <a:latin typeface="Lato"/>
+              </a:rPr>
+              <a:t>código</a:t>
+            </a:r>
+            <a:r>
+              <a:rPr lang="en-US" sz="2600" spc="260" dirty="0">
+                <a:solidFill>
+                  <a:srgbClr val="000000"/>
+                </a:solidFill>
+                <a:latin typeface="Lato"/>
+              </a:rPr>
+              <a:t> </a:t>
+            </a:r>
+            <a:r>
+              <a:rPr lang="en-US" sz="2600" spc="260" dirty="0" err="1">
+                <a:solidFill>
+                  <a:srgbClr val="000000"/>
+                </a:solidFill>
+                <a:latin typeface="Lato"/>
+              </a:rPr>
+              <a:t>dentro</a:t>
+            </a:r>
+            <a:r>
+              <a:rPr lang="en-US" sz="2600" spc="260" dirty="0">
+                <a:solidFill>
+                  <a:srgbClr val="000000"/>
+                </a:solidFill>
+                <a:latin typeface="Lato"/>
+              </a:rPr>
+              <a:t> </a:t>
+            </a:r>
+            <a:r>
+              <a:rPr lang="en-US" sz="2600" spc="260" dirty="0" err="1">
+                <a:solidFill>
+                  <a:srgbClr val="000000"/>
+                </a:solidFill>
+                <a:latin typeface="Lato"/>
+              </a:rPr>
+              <a:t>dele</a:t>
+            </a:r>
+            <a:r>
+              <a:rPr lang="en-US" sz="2600" spc="260" dirty="0">
+                <a:solidFill>
+                  <a:srgbClr val="000000"/>
+                </a:solidFill>
+                <a:latin typeface="Lato"/>
+              </a:rPr>
+              <a:t>:</a:t>
+            </a:r>
+            <a:endParaRPr lang="en-US" sz="2600" spc="260" dirty="0">
+              <a:solidFill>
+                <a:srgbClr val="000000"/>
+              </a:solidFill>
+              <a:latin typeface="Lato"/>
+              <a:ea typeface="Lato"/>
+              <a:cs typeface="Lato"/>
+            </a:endParaRPr>
           </a:p>
         </p:txBody>
       </p:sp>
@@ -8063,7 +8699,7 @@
         </p:nvSpPr>
         <p:spPr>
           <a:xfrm>
-            <a:off x="1028700" y="6150122"/>
+            <a:off x="1028700" y="6397257"/>
             <a:ext cx="16230600" cy="448309"/>
           </a:xfrm>
           <a:prstGeom prst="rect">

</xml_diff>

<commit_message>
Correção do layout row
</commit_message>
<xml_diff>
--- a/Aula07-Layouts no Flutter/Aula07-Layouts no Flutter.pptx
+++ b/Aula07-Layouts no Flutter/Aula07-Layouts no Flutter.pptx
@@ -169,7 +169,7 @@
 <p1510:revInfo xmlns:a="http://schemas.openxmlformats.org/drawingml/2006/main" xmlns:r="http://schemas.openxmlformats.org/officeDocument/2006/relationships" xmlns:p1510="http://schemas.microsoft.com/office/powerpoint/2015/10/main">
   <p1510:revLst>
     <p1510:client id="{005E03CD-EFF0-41C2-AA4E-14BAF2BC1F0F}" v="28" dt="2024-03-31T17:54:42.808"/>
-    <p1510:client id="{4614427A-7FD7-4BB3-BFFA-0F1CA40DB76D}" v="108" dt="2024-03-31T18:02:43.844"/>
+    <p1510:client id="{4614427A-7FD7-4BB3-BFFA-0F1CA40DB76D}" v="195" dt="2024-03-31T18:06:44.617"/>
   </p1510:revLst>
 </p1510:revInfo>
 </file>
@@ -4066,15 +4066,15 @@
         </p:nvSpPr>
         <p:spPr>
           <a:xfrm>
-            <a:off x="1028700" y="2282017"/>
-            <a:ext cx="8115300" cy="2417513"/>
+            <a:off x="1121376" y="3085206"/>
+            <a:ext cx="7590137" cy="3016723"/>
           </a:xfrm>
           <a:prstGeom prst="rect">
             <a:avLst/>
           </a:prstGeom>
         </p:spPr>
         <p:txBody>
-          <a:bodyPr lIns="0" tIns="0" rIns="0" bIns="0" rtlCol="0" anchor="t">
+          <a:bodyPr wrap="square" lIns="0" tIns="0" rIns="0" bIns="0" rtlCol="0" anchor="t">
             <a:spAutoFit/>
           </a:bodyPr>
           <a:lstStyle/>
@@ -4085,32 +4085,265 @@
               </a:lnSpc>
             </a:pPr>
             <a:r>
-              <a:rPr lang="en-US" sz="3447" spc="344">
-                <a:solidFill>
-                  <a:srgbClr val="000000"/>
-                </a:solidFill>
-                <a:latin typeface="Lato"/>
-              </a:rPr>
-              <a:t>No exemplo disponível </a:t>
-            </a:r>
-            <a:r>
-              <a:rPr lang="en-US" sz="3447" u="sng" spc="344">
-                <a:solidFill>
-                  <a:srgbClr val="5271FF"/>
-                </a:solidFill>
-                <a:latin typeface="Lato"/>
-                <a:hlinkClick r:id="rId3" tooltip="https://github.com/marcosdosea/TreinamentoFlutter/blob/main/Aula07-Layouts%20no%20Flutter/layoutRow.dart"/>
-              </a:rPr>
-              <a:t>aqui</a:t>
-            </a:r>
-            <a:r>
-              <a:rPr lang="en-US" sz="3447" spc="344">
-                <a:solidFill>
-                  <a:srgbClr val="000000"/>
-                </a:solidFill>
-                <a:latin typeface="Lato"/>
-              </a:rPr>
-              <a:t>, usamos Row para exibir três imagens em uma tela do app, uma ao lado da outra.</a:t>
+              <a:rPr lang="en-US" sz="3400" spc="344" dirty="0">
+                <a:solidFill>
+                  <a:srgbClr val="000000"/>
+                </a:solidFill>
+                <a:latin typeface="Lato"/>
+              </a:rPr>
+              <a:t>No </a:t>
+            </a:r>
+            <a:r>
+              <a:rPr lang="en-US" sz="3400" spc="344" dirty="0" err="1">
+                <a:solidFill>
+                  <a:srgbClr val="000000"/>
+                </a:solidFill>
+                <a:latin typeface="Lato"/>
+              </a:rPr>
+              <a:t>exemplo</a:t>
+            </a:r>
+            <a:r>
+              <a:rPr lang="en-US" sz="3400" spc="344" dirty="0">
+                <a:solidFill>
+                  <a:srgbClr val="000000"/>
+                </a:solidFill>
+                <a:latin typeface="Lato"/>
+              </a:rPr>
+              <a:t> </a:t>
+            </a:r>
+            <a:r>
+              <a:rPr lang="en-US" sz="3400" spc="344" dirty="0" err="1">
+                <a:solidFill>
+                  <a:srgbClr val="000000"/>
+                </a:solidFill>
+                <a:latin typeface="Lato"/>
+              </a:rPr>
+              <a:t>disponível</a:t>
+            </a:r>
+            <a:r>
+              <a:rPr lang="en-US" sz="3400" spc="344" dirty="0">
+                <a:solidFill>
+                  <a:srgbClr val="000000"/>
+                </a:solidFill>
+                <a:latin typeface="Lato"/>
+              </a:rPr>
+              <a:t> </a:t>
+            </a:r>
+            <a:r>
+              <a:rPr lang="en-US" sz="3400" spc="344" dirty="0" err="1">
+                <a:solidFill>
+                  <a:srgbClr val="000000"/>
+                </a:solidFill>
+                <a:latin typeface="Lato"/>
+              </a:rPr>
+              <a:t>em</a:t>
+            </a:r>
+            <a:r>
+              <a:rPr lang="en-US" sz="3400" spc="344" dirty="0">
+                <a:solidFill>
+                  <a:srgbClr val="000000"/>
+                </a:solidFill>
+                <a:latin typeface="Lato"/>
+              </a:rPr>
+              <a:t> </a:t>
+            </a:r>
+            <a:r>
+              <a:rPr lang="en-US" sz="3400" spc="344" dirty="0" err="1">
+                <a:solidFill>
+                  <a:srgbClr val="000000"/>
+                </a:solidFill>
+                <a:latin typeface="Lato"/>
+              </a:rPr>
+              <a:t>layoutRow.dart</a:t>
+            </a:r>
+            <a:r>
+              <a:rPr lang="en-US" sz="3400" spc="344" dirty="0">
+                <a:solidFill>
+                  <a:srgbClr val="000000"/>
+                </a:solidFill>
+                <a:latin typeface="Lato"/>
+              </a:rPr>
+              <a:t>, </a:t>
+            </a:r>
+            <a:r>
+              <a:rPr lang="en-US" sz="3400" spc="344" dirty="0" err="1">
+                <a:solidFill>
+                  <a:srgbClr val="000000"/>
+                </a:solidFill>
+                <a:latin typeface="Lato"/>
+              </a:rPr>
+              <a:t>usamos</a:t>
+            </a:r>
+            <a:r>
+              <a:rPr lang="en-US" sz="3400" spc="344" dirty="0">
+                <a:solidFill>
+                  <a:srgbClr val="000000"/>
+                </a:solidFill>
+                <a:latin typeface="Lato"/>
+              </a:rPr>
+              <a:t> Row para </a:t>
+            </a:r>
+            <a:r>
+              <a:rPr lang="en-US" sz="3400" spc="344" dirty="0" err="1">
+                <a:solidFill>
+                  <a:srgbClr val="000000"/>
+                </a:solidFill>
+                <a:latin typeface="Lato"/>
+              </a:rPr>
+              <a:t>exibir</a:t>
+            </a:r>
+            <a:r>
+              <a:rPr lang="en-US" sz="3400" spc="344" dirty="0">
+                <a:solidFill>
+                  <a:srgbClr val="000000"/>
+                </a:solidFill>
+                <a:latin typeface="Lato"/>
+              </a:rPr>
+              <a:t> </a:t>
+            </a:r>
+            <a:r>
+              <a:rPr lang="en-US" sz="3400" spc="344" dirty="0" err="1">
+                <a:solidFill>
+                  <a:srgbClr val="000000"/>
+                </a:solidFill>
+                <a:latin typeface="Lato"/>
+              </a:rPr>
+              <a:t>três</a:t>
+            </a:r>
+            <a:r>
+              <a:rPr lang="en-US" sz="3400" spc="344" dirty="0">
+                <a:solidFill>
+                  <a:srgbClr val="000000"/>
+                </a:solidFill>
+                <a:latin typeface="Lato"/>
+              </a:rPr>
+              <a:t> imagens </a:t>
+            </a:r>
+            <a:r>
+              <a:rPr lang="en-US" sz="3400" spc="344" dirty="0" err="1">
+                <a:solidFill>
+                  <a:srgbClr val="000000"/>
+                </a:solidFill>
+                <a:latin typeface="Lato"/>
+              </a:rPr>
+              <a:t>em</a:t>
+            </a:r>
+            <a:r>
+              <a:rPr lang="en-US" sz="3400" spc="344" dirty="0">
+                <a:solidFill>
+                  <a:srgbClr val="000000"/>
+                </a:solidFill>
+                <a:latin typeface="Lato"/>
+              </a:rPr>
+              <a:t> </a:t>
+            </a:r>
+            <a:r>
+              <a:rPr lang="en-US" sz="3400" spc="344" dirty="0" err="1">
+                <a:solidFill>
+                  <a:srgbClr val="000000"/>
+                </a:solidFill>
+                <a:latin typeface="Lato"/>
+              </a:rPr>
+              <a:t>uma</a:t>
+            </a:r>
+            <a:r>
+              <a:rPr lang="en-US" sz="3400" spc="344" dirty="0">
+                <a:solidFill>
+                  <a:srgbClr val="000000"/>
+                </a:solidFill>
+                <a:latin typeface="Lato"/>
+              </a:rPr>
+              <a:t> </a:t>
+            </a:r>
+            <a:r>
+              <a:rPr lang="en-US" sz="3400" spc="344" dirty="0" err="1">
+                <a:solidFill>
+                  <a:srgbClr val="000000"/>
+                </a:solidFill>
+                <a:latin typeface="Lato"/>
+              </a:rPr>
+              <a:t>tela</a:t>
+            </a:r>
+            <a:r>
+              <a:rPr lang="en-US" sz="3400" spc="344" dirty="0">
+                <a:solidFill>
+                  <a:srgbClr val="000000"/>
+                </a:solidFill>
+                <a:latin typeface="Lato"/>
+              </a:rPr>
+              <a:t> do app, </a:t>
+            </a:r>
+            <a:r>
+              <a:rPr lang="en-US" sz="3400" spc="344" dirty="0" err="1">
+                <a:solidFill>
+                  <a:srgbClr val="000000"/>
+                </a:solidFill>
+                <a:latin typeface="Lato"/>
+              </a:rPr>
+              <a:t>uma</a:t>
+            </a:r>
+            <a:r>
+              <a:rPr lang="en-US" sz="3400" spc="344" dirty="0">
+                <a:solidFill>
+                  <a:srgbClr val="000000"/>
+                </a:solidFill>
+                <a:latin typeface="Lato"/>
+              </a:rPr>
+              <a:t> </a:t>
+            </a:r>
+            <a:r>
+              <a:rPr lang="en-US" sz="3400" spc="344" dirty="0" err="1">
+                <a:solidFill>
+                  <a:srgbClr val="000000"/>
+                </a:solidFill>
+                <a:latin typeface="Lato"/>
+              </a:rPr>
+              <a:t>ao</a:t>
+            </a:r>
+            <a:r>
+              <a:rPr lang="en-US" sz="3400" spc="344" dirty="0">
+                <a:solidFill>
+                  <a:srgbClr val="000000"/>
+                </a:solidFill>
+                <a:latin typeface="Lato"/>
+              </a:rPr>
+              <a:t> </a:t>
+            </a:r>
+            <a:r>
+              <a:rPr lang="en-US" sz="3400" spc="344" dirty="0" err="1">
+                <a:solidFill>
+                  <a:srgbClr val="000000"/>
+                </a:solidFill>
+                <a:latin typeface="Lato"/>
+              </a:rPr>
+              <a:t>lado</a:t>
+            </a:r>
+            <a:r>
+              <a:rPr lang="en-US" sz="3400" spc="344" dirty="0">
+                <a:solidFill>
+                  <a:srgbClr val="000000"/>
+                </a:solidFill>
+                <a:latin typeface="Lato"/>
+              </a:rPr>
+              <a:t> da </a:t>
+            </a:r>
+            <a:r>
+              <a:rPr lang="en-US" sz="3400" spc="344" dirty="0" err="1">
+                <a:solidFill>
+                  <a:srgbClr val="000000"/>
+                </a:solidFill>
+                <a:latin typeface="Lato"/>
+              </a:rPr>
+              <a:t>outra</a:t>
+            </a:r>
+            <a:r>
+              <a:rPr lang="en-US" sz="3400" spc="344" dirty="0">
+                <a:solidFill>
+                  <a:srgbClr val="000000"/>
+                </a:solidFill>
+                <a:latin typeface="Lato"/>
+              </a:rPr>
+              <a:t>.</a:t>
             </a:r>
           </a:p>
         </p:txBody>
@@ -4282,7 +4515,7 @@
         </p:nvSpPr>
         <p:spPr>
           <a:xfrm>
-            <a:off x="10892491" y="3135255"/>
+            <a:off x="10892491" y="2872674"/>
             <a:ext cx="6480567" cy="3867265"/>
           </a:xfrm>
           <a:custGeom>
@@ -4442,7 +4675,7 @@
         </p:nvSpPr>
         <p:spPr>
           <a:xfrm>
-            <a:off x="10232013" y="7450925"/>
+            <a:off x="10108445" y="7142006"/>
             <a:ext cx="8055987" cy="1108710"/>
           </a:xfrm>
           <a:prstGeom prst="rect">

</xml_diff>